<commit_message>
fix linear sections wording
Use malloc heap instead of heap
+ main stack everywhere
</commit_message>
<xml_diff>
--- a/ApplicationDeveloperGuide/images/linear-memory-overview.pptx
+++ b/ApplicationDeveloperGuide/images/linear-memory-overview.pptx
@@ -237,7 +237,7 @@
               <a:rPr lang="fr-FR" smtClean="0">
                 <a:latin typeface="Calibri Regular" charset="0"/>
               </a:rPr>
-              <a:t>mardi 3 juin 2025</a:t>
+              <a:t>mercredi 4 juin 2025</a:t>
             </a:fld>
             <a:endParaRPr lang="en-US" dirty="0">
               <a:latin typeface="Calibri Regular" charset="0"/>
@@ -415,7 +415,7 @@
           <a:p>
             <a:fld id="{885721CF-495B-2B41-A23A-4D3221F80235}" type="datetime2">
               <a:rPr lang="fr-FR" smtClean="0"/>
-              <a:t>mardi 3 juin 2025</a:t>
+              <a:t>mercredi 4 juin 2025</a:t>
             </a:fld>
             <a:endParaRPr lang="en-US" dirty="0"/>
           </a:p>
@@ -15964,7 +15964,7 @@
         <p:spPr>
           <a:xfrm>
             <a:off x="1570839" y="1514279"/>
-            <a:ext cx="8835904" cy="1612098"/>
+            <a:ext cx="8975241" cy="1612098"/>
           </a:xfrm>
           <a:prstGeom prst="rect">
             <a:avLst/>
@@ -16090,7 +16090,7 @@
         <p:spPr>
           <a:xfrm>
             <a:off x="6862356" y="1918814"/>
-            <a:ext cx="3300549" cy="1033391"/>
+            <a:ext cx="3522369" cy="1033391"/>
           </a:xfrm>
           <a:prstGeom prst="rect">
             <a:avLst/>
@@ -16297,37 +16297,6 @@
           </a:prstGeom>
         </p:spPr>
       </p:pic>
-      <p:pic>
-        <p:nvPicPr>
-          <p:cNvPr id="42" name="Picture 41">
-            <a:extLst>
-              <a:ext uri="{FF2B5EF4-FFF2-40B4-BE49-F238E27FC236}">
-                <a16:creationId xmlns:a16="http://schemas.microsoft.com/office/drawing/2014/main" id="{D2F58684-6C22-9373-ED9E-8E125E9F1925}"/>
-              </a:ext>
-            </a:extLst>
-          </p:cNvPr>
-          <p:cNvPicPr>
-            <a:picLocks noChangeAspect="1"/>
-          </p:cNvPicPr>
-          <p:nvPr/>
-        </p:nvPicPr>
-        <p:blipFill>
-          <a:blip r:embed="rId3"/>
-          <a:srcRect r="2153"/>
-          <a:stretch>
-            <a:fillRect/>
-          </a:stretch>
-        </p:blipFill>
-        <p:spPr>
-          <a:xfrm>
-            <a:off x="6862356" y="2205471"/>
-            <a:ext cx="3300549" cy="687059"/>
-          </a:xfrm>
-          <a:prstGeom prst="rect">
-            <a:avLst/>
-          </a:prstGeom>
-        </p:spPr>
-      </p:pic>
       <p:sp>
         <p:nvSpPr>
           <p:cNvPr id="43" name="Rectangle 42">
@@ -16563,6 +16532,36 @@
           </a:p>
         </p:txBody>
       </p:sp>
+      <p:pic>
+        <p:nvPicPr>
+          <p:cNvPr id="9" name="Picture 8">
+            <a:extLst>
+              <a:ext uri="{FF2B5EF4-FFF2-40B4-BE49-F238E27FC236}">
+                <a16:creationId xmlns:a16="http://schemas.microsoft.com/office/drawing/2014/main" id="{952CA176-8C87-128F-8EFF-450D68EF2D5B}"/>
+              </a:ext>
+            </a:extLst>
+          </p:cNvPr>
+          <p:cNvPicPr>
+            <a:picLocks noChangeAspect="1"/>
+          </p:cNvPicPr>
+          <p:nvPr/>
+        </p:nvPicPr>
+        <p:blipFill>
+          <a:blip r:embed="rId3"/>
+          <a:stretch>
+            <a:fillRect/>
+          </a:stretch>
+        </p:blipFill>
+        <p:spPr>
+          <a:xfrm>
+            <a:off x="6965511" y="2178469"/>
+            <a:ext cx="3316057" cy="683642"/>
+          </a:xfrm>
+          <a:prstGeom prst="rect">
+            <a:avLst/>
+          </a:prstGeom>
+        </p:spPr>
+      </p:pic>
     </p:spTree>
     <p:extLst>
       <p:ext uri="{BB962C8B-B14F-4D97-AF65-F5344CB8AC3E}">

</xml_diff>